<commit_message>
after Sao Paulo 2010
</commit_message>
<xml_diff>
--- a/exo-developer/420-crash/slides/420-CRaSH-XDev-en.pptx
+++ b/exo-developer/420-crash/slides/420-CRaSH-XDev-en.pptx
@@ -22362,15 +22362,7 @@
                   <a:srgbClr val="4C4C4C"/>
                 </a:solidFill>
               </a:rPr>
-              <a:t>Connect </a:t>
-            </a:r>
-            <a:r>
-              <a:rPr lang="en-US" sz="2000" b="1" i="1" dirty="0" smtClean="0">
-                <a:solidFill>
-                  <a:srgbClr val="4C4C4C"/>
-                </a:solidFill>
-              </a:rPr>
-              <a:t>to </a:t>
+              <a:t>Connect to </a:t>
             </a:r>
             <a:r>
               <a:rPr lang="en-US" sz="2000" b="1" i="1" dirty="0" err="1" smtClean="0">
@@ -22402,21 +22394,8 @@
                   <a:srgbClr val="4C4C4C"/>
                 </a:solidFill>
               </a:rPr>
-              <a:t> </a:t>
-            </a:r>
-            <a:r>
-              <a:rPr lang="en-US" sz="2000" b="1" i="1" dirty="0" smtClean="0">
-                <a:solidFill>
-                  <a:srgbClr val="4C4C4C"/>
-                </a:solidFill>
-              </a:rPr>
-              <a:t>(port 2000) or telnet (port 5000)</a:t>
-            </a:r>
-            <a:endParaRPr lang="en-US" sz="2000" b="1" i="1" dirty="0" smtClean="0">
-              <a:solidFill>
-                <a:srgbClr val="4C4C4C"/>
-              </a:solidFill>
-            </a:endParaRPr>
+              <a:t> (port 2000) or telnet (port 5000)</a:t>
+            </a:r>
           </a:p>
           <a:p>
             <a:pPr marL="258763" indent="-255588" hangingPunct="1">
@@ -22462,15 +22441,7 @@
                   <a:srgbClr val="4C4C4C"/>
                 </a:solidFill>
               </a:rPr>
-              <a:t>Type in your shell: connect -c portal -u root </a:t>
-            </a:r>
-            <a:r>
-              <a:rPr lang="en-US" sz="2000" b="1" i="1" dirty="0" smtClean="0">
-                <a:solidFill>
-                  <a:srgbClr val="4C4C4C"/>
-                </a:solidFill>
-              </a:rPr>
-              <a:t>-p </a:t>
+              <a:t>Type in your shell: connect -c portal -u root -p </a:t>
             </a:r>
             <a:r>
               <a:rPr lang="en-US" sz="2000" b="1" i="1" dirty="0" err="1" smtClean="0">
@@ -22486,21 +22457,8 @@
                   <a:srgbClr val="4C4C4C"/>
                 </a:solidFill>
               </a:rPr>
-              <a:t> </a:t>
-            </a:r>
-            <a:r>
-              <a:rPr lang="en-US" sz="2000" b="1" i="1" dirty="0" smtClean="0">
-                <a:solidFill>
-                  <a:srgbClr val="4C4C4C"/>
-                </a:solidFill>
-              </a:rPr>
-              <a:t>collaboration</a:t>
-            </a:r>
-            <a:endParaRPr lang="en-US" sz="2000" b="1" i="1" dirty="0" smtClean="0">
-              <a:solidFill>
-                <a:srgbClr val="4C4C4C"/>
-              </a:solidFill>
-            </a:endParaRPr>
+              <a:t> collaboration</a:t>
+            </a:r>
           </a:p>
           <a:p>
             <a:pPr marL="258763" indent="-255588" hangingPunct="1">
@@ -22736,7 +22694,46 @@
                   <a:srgbClr val="4C4C4C"/>
                 </a:solidFill>
               </a:rPr>
-              <a:t> to an existing node. (syntax: </a:t>
+              <a:t> to an existing </a:t>
+            </a:r>
+            <a:r>
+              <a:rPr lang="en-US" sz="2000" b="1" i="1" smtClean="0">
+                <a:solidFill>
+                  <a:srgbClr val="4C4C4C"/>
+                </a:solidFill>
+              </a:rPr>
+              <a:t>node</a:t>
+            </a:r>
+            <a:r>
+              <a:rPr lang="en-US" sz="2000" b="1" i="1" smtClean="0">
+                <a:solidFill>
+                  <a:srgbClr val="4C4C4C"/>
+                </a:solidFill>
+              </a:rPr>
+              <a:t>.</a:t>
+            </a:r>
+            <a:br>
+              <a:rPr lang="en-US" sz="2000" b="1" i="1" smtClean="0">
+                <a:solidFill>
+                  <a:srgbClr val="4C4C4C"/>
+                </a:solidFill>
+              </a:rPr>
+            </a:br>
+            <a:r>
+              <a:rPr lang="en-US" sz="2000" b="1" i="1" smtClean="0">
+                <a:solidFill>
+                  <a:srgbClr val="4C4C4C"/>
+                </a:solidFill>
+              </a:rPr>
+              <a:t>(</a:t>
+            </a:r>
+            <a:r>
+              <a:rPr lang="en-US" sz="2000" b="1" i="1" dirty="0" smtClean="0">
+                <a:solidFill>
+                  <a:srgbClr val="4C4C4C"/>
+                </a:solidFill>
+              </a:rPr>
+              <a:t>syntax: </a:t>
             </a:r>
             <a:r>
               <a:rPr lang="en-US" sz="2000" dirty="0" err="1" smtClean="0">
@@ -22815,15 +22812,7 @@
                   <a:srgbClr val="4C4C4C"/>
                 </a:solidFill>
               </a:rPr>
-              <a:t>Test 5 different select use cases as seen in http://wiki.exoplatform.org/xwiki/bin/view/JCR/JCR+Query+Usecases</a:t>
-            </a:r>
-            <a:r>
-              <a:rPr lang="en-US" sz="2000" b="1" i="1" dirty="0" smtClean="0">
-                <a:solidFill>
-                  <a:srgbClr val="4C4C4C"/>
-                </a:solidFill>
-              </a:rPr>
-              <a:t>.</a:t>
+              <a:t>Test 5 different select use cases as seen in http://wiki.exoplatform.org/xwiki/bin/view/JCR/JCR+Query+Usecases.</a:t>
             </a:r>
           </a:p>
           <a:p>

</xml_diff>